<commit_message>
Added design patterns and RPM package section to Cahier de conception
</commit_message>
<xml_diff>
--- a/documents/Cahier de Conception.pptx
+++ b/documents/Cahier de Conception.pptx
@@ -18,7 +18,11 @@
     <p:sldId id="268" r:id="rId12"/>
     <p:sldId id="269" r:id="rId13"/>
     <p:sldId id="270" r:id="rId14"/>
-    <p:sldId id="265" r:id="rId15"/>
+    <p:sldId id="273" r:id="rId15"/>
+    <p:sldId id="265" r:id="rId16"/>
+    <p:sldId id="272" r:id="rId17"/>
+    <p:sldId id="274" r:id="rId18"/>
+    <p:sldId id="271" r:id="rId19"/>
   </p:sldIdLst>
   <p:sldSz cx="12192000" cy="6858000"/>
   <p:notesSz cx="6858000" cy="9144000"/>
@@ -272,7 +276,7 @@
           <a:p>
             <a:fld id="{CD1DAE3F-0F13-4F77-961D-9D1AADB9529E}" type="datetimeFigureOut">
               <a:rPr lang="en-US" smtClean="0"/>
-              <a:t>6/17/2024</a:t>
+              <a:t>7/4/2024</a:t>
             </a:fld>
             <a:endParaRPr lang="en-US"/>
           </a:p>
@@ -470,7 +474,7 @@
           <a:p>
             <a:fld id="{CD1DAE3F-0F13-4F77-961D-9D1AADB9529E}" type="datetimeFigureOut">
               <a:rPr lang="en-US" smtClean="0"/>
-              <a:t>6/17/2024</a:t>
+              <a:t>7/4/2024</a:t>
             </a:fld>
             <a:endParaRPr lang="en-US"/>
           </a:p>
@@ -678,7 +682,7 @@
           <a:p>
             <a:fld id="{CD1DAE3F-0F13-4F77-961D-9D1AADB9529E}" type="datetimeFigureOut">
               <a:rPr lang="en-US" smtClean="0"/>
-              <a:t>6/17/2024</a:t>
+              <a:t>7/4/2024</a:t>
             </a:fld>
             <a:endParaRPr lang="en-US"/>
           </a:p>
@@ -876,7 +880,7 @@
           <a:p>
             <a:fld id="{CD1DAE3F-0F13-4F77-961D-9D1AADB9529E}" type="datetimeFigureOut">
               <a:rPr lang="en-US" smtClean="0"/>
-              <a:t>6/17/2024</a:t>
+              <a:t>7/4/2024</a:t>
             </a:fld>
             <a:endParaRPr lang="en-US"/>
           </a:p>
@@ -1151,7 +1155,7 @@
           <a:p>
             <a:fld id="{CD1DAE3F-0F13-4F77-961D-9D1AADB9529E}" type="datetimeFigureOut">
               <a:rPr lang="en-US" smtClean="0"/>
-              <a:t>6/17/2024</a:t>
+              <a:t>7/4/2024</a:t>
             </a:fld>
             <a:endParaRPr lang="en-US"/>
           </a:p>
@@ -1416,7 +1420,7 @@
           <a:p>
             <a:fld id="{CD1DAE3F-0F13-4F77-961D-9D1AADB9529E}" type="datetimeFigureOut">
               <a:rPr lang="en-US" smtClean="0"/>
-              <a:t>6/17/2024</a:t>
+              <a:t>7/4/2024</a:t>
             </a:fld>
             <a:endParaRPr lang="en-US"/>
           </a:p>
@@ -1828,7 +1832,7 @@
           <a:p>
             <a:fld id="{CD1DAE3F-0F13-4F77-961D-9D1AADB9529E}" type="datetimeFigureOut">
               <a:rPr lang="en-US" smtClean="0"/>
-              <a:t>6/17/2024</a:t>
+              <a:t>7/4/2024</a:t>
             </a:fld>
             <a:endParaRPr lang="en-US"/>
           </a:p>
@@ -1969,7 +1973,7 @@
           <a:p>
             <a:fld id="{CD1DAE3F-0F13-4F77-961D-9D1AADB9529E}" type="datetimeFigureOut">
               <a:rPr lang="en-US" smtClean="0"/>
-              <a:t>6/17/2024</a:t>
+              <a:t>7/4/2024</a:t>
             </a:fld>
             <a:endParaRPr lang="en-US"/>
           </a:p>
@@ -2082,7 +2086,7 @@
           <a:p>
             <a:fld id="{CD1DAE3F-0F13-4F77-961D-9D1AADB9529E}" type="datetimeFigureOut">
               <a:rPr lang="en-US" smtClean="0"/>
-              <a:t>6/17/2024</a:t>
+              <a:t>7/4/2024</a:t>
             </a:fld>
             <a:endParaRPr lang="en-US"/>
           </a:p>
@@ -2393,7 +2397,7 @@
           <a:p>
             <a:fld id="{CD1DAE3F-0F13-4F77-961D-9D1AADB9529E}" type="datetimeFigureOut">
               <a:rPr lang="en-US" smtClean="0"/>
-              <a:t>6/17/2024</a:t>
+              <a:t>7/4/2024</a:t>
             </a:fld>
             <a:endParaRPr lang="en-US"/>
           </a:p>
@@ -2681,7 +2685,7 @@
           <a:p>
             <a:fld id="{CD1DAE3F-0F13-4F77-961D-9D1AADB9529E}" type="datetimeFigureOut">
               <a:rPr lang="en-US" smtClean="0"/>
-              <a:t>6/17/2024</a:t>
+              <a:t>7/4/2024</a:t>
             </a:fld>
             <a:endParaRPr lang="en-US"/>
           </a:p>
@@ -2922,7 +2926,7 @@
           <a:p>
             <a:fld id="{CD1DAE3F-0F13-4F77-961D-9D1AADB9529E}" type="datetimeFigureOut">
               <a:rPr lang="en-US" smtClean="0"/>
-              <a:t>6/17/2024</a:t>
+              <a:t>7/4/2024</a:t>
             </a:fld>
             <a:endParaRPr lang="en-US"/>
           </a:p>
@@ -4096,7 +4100,12 @@
             <p:ph type="title"/>
           </p:nvPr>
         </p:nvSpPr>
-        <p:spPr/>
+        <p:spPr>
+          <a:xfrm>
+            <a:off x="838200" y="365126"/>
+            <a:ext cx="10515600" cy="907590"/>
+          </a:xfrm>
+        </p:spPr>
         <p:txBody>
           <a:bodyPr/>
           <a:lstStyle/>
@@ -4131,7 +4140,12 @@
             <p:ph idx="1"/>
           </p:nvPr>
         </p:nvSpPr>
-        <p:spPr/>
+        <p:spPr>
+          <a:xfrm>
+            <a:off x="838200" y="1272716"/>
+            <a:ext cx="10515600" cy="4904247"/>
+          </a:xfrm>
+        </p:spPr>
         <p:txBody>
           <a:bodyPr/>
           <a:lstStyle/>
@@ -4155,10 +4169,10 @@
       </p:sp>
       <p:pic>
         <p:nvPicPr>
-          <p:cNvPr id="9" name="Picture 8">
-            <a:extLst>
-              <a:ext uri="{FF2B5EF4-FFF2-40B4-BE49-F238E27FC236}">
-                <a16:creationId xmlns:a16="http://schemas.microsoft.com/office/drawing/2014/main" id="{147132AA-370D-314A-949F-6E94FF617B8C}"/>
+          <p:cNvPr id="5" name="Picture 4">
+            <a:extLst>
+              <a:ext uri="{FF2B5EF4-FFF2-40B4-BE49-F238E27FC236}">
+                <a16:creationId xmlns:a16="http://schemas.microsoft.com/office/drawing/2014/main" id="{D449D3ED-E5C1-6E2E-DC95-783040F7F6FA}"/>
               </a:ext>
             </a:extLst>
           </p:cNvPr>
@@ -4168,21 +4182,15 @@
           <p:nvPr/>
         </p:nvPicPr>
         <p:blipFill>
-          <a:blip r:embed="rId2">
-            <a:extLst>
-              <a:ext uri="{28A0092B-C50C-407E-A947-70E740481C1C}">
-                <a14:useLocalDpi xmlns:a14="http://schemas.microsoft.com/office/drawing/2010/main" val="0"/>
-              </a:ext>
-            </a:extLst>
-          </a:blip>
+          <a:blip r:embed="rId2"/>
           <a:stretch>
             <a:fillRect/>
           </a:stretch>
         </p:blipFill>
         <p:spPr>
           <a:xfrm>
-            <a:off x="2871787" y="2558823"/>
-            <a:ext cx="6448425" cy="3438525"/>
+            <a:off x="838200" y="2209800"/>
+            <a:ext cx="10482991" cy="4520073"/>
           </a:xfrm>
           <a:prstGeom prst="rect">
             <a:avLst/>
@@ -4235,9 +4243,16 @@
             <p:ph type="title"/>
           </p:nvPr>
         </p:nvSpPr>
-        <p:spPr/>
-        <p:txBody>
-          <a:bodyPr/>
+        <p:spPr>
+          <a:xfrm>
+            <a:off x="838200" y="365125"/>
+            <a:ext cx="10515600" cy="650875"/>
+          </a:xfrm>
+        </p:spPr>
+        <p:txBody>
+          <a:bodyPr>
+            <a:normAutofit fontScale="90000"/>
+          </a:bodyPr>
           <a:lstStyle/>
           <a:p>
             <a:r>
@@ -4270,7 +4285,12 @@
             <p:ph idx="1"/>
           </p:nvPr>
         </p:nvSpPr>
-        <p:spPr/>
+        <p:spPr>
+          <a:xfrm>
+            <a:off x="838200" y="1016000"/>
+            <a:ext cx="10515600" cy="5160963"/>
+          </a:xfrm>
+        </p:spPr>
         <p:txBody>
           <a:bodyPr/>
           <a:lstStyle/>
@@ -4298,10 +4318,10 @@
       </p:sp>
       <p:pic>
         <p:nvPicPr>
-          <p:cNvPr id="5" name="Picture 4">
-            <a:extLst>
-              <a:ext uri="{FF2B5EF4-FFF2-40B4-BE49-F238E27FC236}">
-                <a16:creationId xmlns:a16="http://schemas.microsoft.com/office/drawing/2014/main" id="{62EA33D9-69AE-6335-85F8-860A2080324A}"/>
+          <p:cNvPr id="6" name="Picture 5">
+            <a:extLst>
+              <a:ext uri="{FF2B5EF4-FFF2-40B4-BE49-F238E27FC236}">
+                <a16:creationId xmlns:a16="http://schemas.microsoft.com/office/drawing/2014/main" id="{87365EF9-EF7B-9411-D039-52D9F4F86A9B}"/>
               </a:ext>
             </a:extLst>
           </p:cNvPr>
@@ -4311,21 +4331,15 @@
           <p:nvPr/>
         </p:nvPicPr>
         <p:blipFill>
-          <a:blip r:embed="rId2">
-            <a:extLst>
-              <a:ext uri="{28A0092B-C50C-407E-A947-70E740481C1C}">
-                <a14:useLocalDpi xmlns:a14="http://schemas.microsoft.com/office/drawing/2010/main" val="0"/>
-              </a:ext>
-            </a:extLst>
-          </a:blip>
+          <a:blip r:embed="rId2"/>
           <a:stretch>
             <a:fillRect/>
           </a:stretch>
         </p:blipFill>
         <p:spPr>
           <a:xfrm>
-            <a:off x="1838325" y="2576513"/>
-            <a:ext cx="8515350" cy="3600450"/>
+            <a:off x="8455" y="1451428"/>
+            <a:ext cx="12175090" cy="5041447"/>
           </a:xfrm>
           <a:prstGeom prst="rect">
             <a:avLst/>
@@ -4378,7 +4392,12 @@
             <p:ph type="title"/>
           </p:nvPr>
         </p:nvSpPr>
-        <p:spPr/>
+        <p:spPr>
+          <a:xfrm>
+            <a:off x="838200" y="365125"/>
+            <a:ext cx="10515600" cy="868589"/>
+          </a:xfrm>
+        </p:spPr>
         <p:txBody>
           <a:bodyPr/>
           <a:lstStyle/>
@@ -4413,7 +4432,12 @@
             <p:ph idx="1"/>
           </p:nvPr>
         </p:nvSpPr>
-        <p:spPr/>
+        <p:spPr>
+          <a:xfrm>
+            <a:off x="838200" y="1378857"/>
+            <a:ext cx="10515600" cy="4798106"/>
+          </a:xfrm>
+        </p:spPr>
         <p:txBody>
           <a:bodyPr/>
           <a:lstStyle/>
@@ -4433,10 +4457,10 @@
       </p:sp>
       <p:pic>
         <p:nvPicPr>
-          <p:cNvPr id="6" name="Picture 5">
-            <a:extLst>
-              <a:ext uri="{FF2B5EF4-FFF2-40B4-BE49-F238E27FC236}">
-                <a16:creationId xmlns:a16="http://schemas.microsoft.com/office/drawing/2014/main" id="{10364A08-CD43-CBA7-3F4D-59022D5BF49F}"/>
+          <p:cNvPr id="5" name="Picture 4">
+            <a:extLst>
+              <a:ext uri="{FF2B5EF4-FFF2-40B4-BE49-F238E27FC236}">
+                <a16:creationId xmlns:a16="http://schemas.microsoft.com/office/drawing/2014/main" id="{FC87A357-BAD3-F620-5A3F-9001C1DFC23E}"/>
               </a:ext>
             </a:extLst>
           </p:cNvPr>
@@ -4446,21 +4470,15 @@
           <p:nvPr/>
         </p:nvPicPr>
         <p:blipFill>
-          <a:blip r:embed="rId2">
-            <a:extLst>
-              <a:ext uri="{28A0092B-C50C-407E-A947-70E740481C1C}">
-                <a14:useLocalDpi xmlns:a14="http://schemas.microsoft.com/office/drawing/2010/main" val="0"/>
-              </a:ext>
-            </a:extLst>
-          </a:blip>
+          <a:blip r:embed="rId2"/>
           <a:stretch>
             <a:fillRect/>
           </a:stretch>
         </p:blipFill>
         <p:spPr>
           <a:xfrm>
-            <a:off x="1643062" y="2426833"/>
-            <a:ext cx="8905875" cy="3571875"/>
+            <a:off x="180149" y="1977420"/>
+            <a:ext cx="11831701" cy="4334480"/>
           </a:xfrm>
           <a:prstGeom prst="rect">
             <a:avLst/>
@@ -4513,7 +4531,12 @@
             <p:ph type="title"/>
           </p:nvPr>
         </p:nvSpPr>
-        <p:spPr/>
+        <p:spPr>
+          <a:xfrm>
+            <a:off x="838200" y="365126"/>
+            <a:ext cx="10515600" cy="796018"/>
+          </a:xfrm>
+        </p:spPr>
         <p:txBody>
           <a:bodyPr/>
           <a:lstStyle/>
@@ -4548,14 +4571,19 @@
             <p:ph idx="1"/>
           </p:nvPr>
         </p:nvSpPr>
-        <p:spPr/>
+        <p:spPr>
+          <a:xfrm>
+            <a:off x="838200" y="1161144"/>
+            <a:ext cx="10515600" cy="5015819"/>
+          </a:xfrm>
+        </p:spPr>
         <p:txBody>
           <a:bodyPr/>
           <a:lstStyle/>
           <a:p>
             <a:r>
               <a:rPr lang="en-US" dirty="0"/>
-              <a:t>Modifier les services</a:t>
+              <a:t>Gestion des services</a:t>
             </a:r>
           </a:p>
           <a:p>
@@ -4564,14 +4592,20 @@
             </a:pPr>
             <a:endParaRPr lang="en-US" dirty="0"/>
           </a:p>
+          <a:p>
+            <a:pPr marL="0" indent="0">
+              <a:buNone/>
+            </a:pPr>
+            <a:endParaRPr lang="en-US" dirty="0"/>
+          </a:p>
         </p:txBody>
       </p:sp>
       <p:pic>
         <p:nvPicPr>
-          <p:cNvPr id="5" name="Picture 4">
-            <a:extLst>
-              <a:ext uri="{FF2B5EF4-FFF2-40B4-BE49-F238E27FC236}">
-                <a16:creationId xmlns:a16="http://schemas.microsoft.com/office/drawing/2014/main" id="{F1FCC25B-9949-02A6-95E7-BCF486F9DA7D}"/>
+          <p:cNvPr id="6" name="Picture 5">
+            <a:extLst>
+              <a:ext uri="{FF2B5EF4-FFF2-40B4-BE49-F238E27FC236}">
+                <a16:creationId xmlns:a16="http://schemas.microsoft.com/office/drawing/2014/main" id="{93A6DFDF-5180-1E2C-7442-49423FDB83E4}"/>
               </a:ext>
             </a:extLst>
           </p:cNvPr>
@@ -4594,8 +4628,8 @@
         </p:blipFill>
         <p:spPr>
           <a:xfrm>
-            <a:off x="1381125" y="2466975"/>
-            <a:ext cx="9429750" cy="3574596"/>
+            <a:off x="246742" y="1593882"/>
+            <a:ext cx="11698515" cy="5015819"/>
           </a:xfrm>
           <a:prstGeom prst="rect">
             <a:avLst/>
@@ -4648,6 +4682,740 @@
             <p:ph type="title"/>
           </p:nvPr>
         </p:nvSpPr>
+        <p:spPr>
+          <a:xfrm>
+            <a:off x="838200" y="365126"/>
+            <a:ext cx="10515600" cy="796018"/>
+          </a:xfrm>
+        </p:spPr>
+        <p:txBody>
+          <a:bodyPr/>
+          <a:lstStyle/>
+          <a:p>
+            <a:r>
+              <a:rPr lang="en-US" dirty="0">
+                <a:solidFill>
+                  <a:srgbClr val="2F5496"/>
+                </a:solidFill>
+                <a:latin typeface="Poppins SemiBold" panose="00000700000000000000" pitchFamily="2" charset="0"/>
+                <a:cs typeface="Poppins SemiBold" panose="00000700000000000000" pitchFamily="2" charset="0"/>
+              </a:rPr>
+              <a:t>DIAGRAMMES DE COMPOSANT</a:t>
+            </a:r>
+            <a:endParaRPr lang="en-US" dirty="0"/>
+          </a:p>
+        </p:txBody>
+      </p:sp>
+      <p:sp>
+        <p:nvSpPr>
+          <p:cNvPr id="3" name="Content Placeholder 2">
+            <a:extLst>
+              <a:ext uri="{FF2B5EF4-FFF2-40B4-BE49-F238E27FC236}">
+                <a16:creationId xmlns:a16="http://schemas.microsoft.com/office/drawing/2014/main" id="{17977F0D-B782-6AEA-0D3C-8207E05FEE6F}"/>
+              </a:ext>
+            </a:extLst>
+          </p:cNvPr>
+          <p:cNvSpPr>
+            <a:spLocks noGrp="1"/>
+          </p:cNvSpPr>
+          <p:nvPr>
+            <p:ph idx="1"/>
+          </p:nvPr>
+        </p:nvSpPr>
+        <p:spPr>
+          <a:xfrm>
+            <a:off x="838200" y="1161144"/>
+            <a:ext cx="10515600" cy="5015819"/>
+          </a:xfrm>
+        </p:spPr>
+        <p:txBody>
+          <a:bodyPr/>
+          <a:lstStyle/>
+          <a:p>
+            <a:pPr marL="0" indent="0">
+              <a:buNone/>
+            </a:pPr>
+            <a:endParaRPr lang="en-US" dirty="0"/>
+          </a:p>
+          <a:p>
+            <a:pPr marL="0" indent="0">
+              <a:buNone/>
+            </a:pPr>
+            <a:endParaRPr lang="en-US" dirty="0"/>
+          </a:p>
+        </p:txBody>
+      </p:sp>
+      <p:pic>
+        <p:nvPicPr>
+          <p:cNvPr id="5" name="Picture 4">
+            <a:extLst>
+              <a:ext uri="{FF2B5EF4-FFF2-40B4-BE49-F238E27FC236}">
+                <a16:creationId xmlns:a16="http://schemas.microsoft.com/office/drawing/2014/main" id="{06255787-661A-7C85-DC2B-CA8C72500384}"/>
+              </a:ext>
+            </a:extLst>
+          </p:cNvPr>
+          <p:cNvPicPr>
+            <a:picLocks noChangeAspect="1"/>
+          </p:cNvPicPr>
+          <p:nvPr/>
+        </p:nvPicPr>
+        <p:blipFill rotWithShape="1">
+          <a:blip r:embed="rId2"/>
+          <a:srcRect l="4236" t="5862" r="12835" b="23872"/>
+          <a:stretch/>
+        </p:blipFill>
+        <p:spPr>
+          <a:xfrm>
+            <a:off x="838200" y="1957162"/>
+            <a:ext cx="10515600" cy="4219801"/>
+          </a:xfrm>
+          <a:prstGeom prst="rect">
+            <a:avLst/>
+          </a:prstGeom>
+        </p:spPr>
+      </p:pic>
+    </p:spTree>
+    <p:extLst>
+      <p:ext uri="{BB962C8B-B14F-4D97-AF65-F5344CB8AC3E}">
+        <p14:creationId xmlns:p14="http://schemas.microsoft.com/office/powerpoint/2010/main" val="3410113728"/>
+      </p:ext>
+    </p:extLst>
+  </p:cSld>
+  <p:clrMapOvr>
+    <a:masterClrMapping/>
+  </p:clrMapOvr>
+</p:sld>
+</file>
+
+<file path=ppt/slides/slide15.xml><?xml version="1.0" encoding="utf-8"?>
+<p:sld xmlns:a="http://schemas.openxmlformats.org/drawingml/2006/main" xmlns:r="http://schemas.openxmlformats.org/officeDocument/2006/relationships" xmlns:p="http://schemas.openxmlformats.org/presentationml/2006/main">
+  <p:cSld>
+    <p:spTree>
+      <p:nvGrpSpPr>
+        <p:cNvPr id="1" name=""/>
+        <p:cNvGrpSpPr/>
+        <p:nvPr/>
+      </p:nvGrpSpPr>
+      <p:grpSpPr>
+        <a:xfrm>
+          <a:off x="0" y="0"/>
+          <a:ext cx="0" cy="0"/>
+          <a:chOff x="0" y="0"/>
+          <a:chExt cx="0" cy="0"/>
+        </a:xfrm>
+      </p:grpSpPr>
+      <p:sp>
+        <p:nvSpPr>
+          <p:cNvPr id="2" name="Title 1">
+            <a:extLst>
+              <a:ext uri="{FF2B5EF4-FFF2-40B4-BE49-F238E27FC236}">
+                <a16:creationId xmlns:a16="http://schemas.microsoft.com/office/drawing/2014/main" id="{2C0DDD44-40B0-E9BF-0699-6BB016023237}"/>
+              </a:ext>
+            </a:extLst>
+          </p:cNvPr>
+          <p:cNvSpPr>
+            <a:spLocks noGrp="1"/>
+          </p:cNvSpPr>
+          <p:nvPr>
+            <p:ph type="title"/>
+          </p:nvPr>
+        </p:nvSpPr>
+        <p:spPr/>
+        <p:txBody>
+          <a:bodyPr/>
+          <a:lstStyle/>
+          <a:p>
+            <a:r>
+              <a:rPr lang="en-US" dirty="0">
+                <a:solidFill>
+                  <a:srgbClr val="2F5496"/>
+                </a:solidFill>
+                <a:latin typeface="Poppins SemiBold" panose="00000700000000000000" pitchFamily="2" charset="0"/>
+                <a:cs typeface="Poppins SemiBold" panose="00000700000000000000" pitchFamily="2" charset="0"/>
+              </a:rPr>
+              <a:t>PATRONS DE CONCEPTION</a:t>
+            </a:r>
+            <a:endParaRPr lang="en-US" dirty="0"/>
+          </a:p>
+        </p:txBody>
+      </p:sp>
+      <p:sp>
+        <p:nvSpPr>
+          <p:cNvPr id="3" name="Content Placeholder 2">
+            <a:extLst>
+              <a:ext uri="{FF2B5EF4-FFF2-40B4-BE49-F238E27FC236}">
+                <a16:creationId xmlns:a16="http://schemas.microsoft.com/office/drawing/2014/main" id="{17977F0D-B782-6AEA-0D3C-8207E05FEE6F}"/>
+              </a:ext>
+            </a:extLst>
+          </p:cNvPr>
+          <p:cNvSpPr>
+            <a:spLocks noGrp="1"/>
+          </p:cNvSpPr>
+          <p:nvPr>
+            <p:ph idx="1"/>
+          </p:nvPr>
+        </p:nvSpPr>
+        <p:spPr>
+          <a:xfrm>
+            <a:off x="838200" y="1854201"/>
+            <a:ext cx="10515600" cy="4351338"/>
+          </a:xfrm>
+        </p:spPr>
+        <p:txBody>
+          <a:bodyPr>
+            <a:normAutofit/>
+          </a:bodyPr>
+          <a:lstStyle/>
+          <a:p>
+            <a:r>
+              <a:rPr lang="fr-FR" dirty="0"/>
+              <a:t>Un </a:t>
+            </a:r>
+            <a:r>
+              <a:rPr lang="fr-FR" b="1" dirty="0"/>
+              <a:t>patron de conception</a:t>
+            </a:r>
+            <a:r>
+              <a:rPr lang="fr-FR" dirty="0"/>
+              <a:t> est une solution générale et réutilisable à un problème de conception logicielle.</a:t>
+            </a:r>
+          </a:p>
+          <a:p>
+            <a:endParaRPr lang="fr-FR" dirty="0"/>
+          </a:p>
+          <a:p>
+            <a:r>
+              <a:rPr lang="fr-FR" dirty="0"/>
+              <a:t>Les patrons de conception sont des modèles pouvant être appliqués à des défis de conception particuliers.</a:t>
+            </a:r>
+          </a:p>
+          <a:p>
+            <a:endParaRPr lang="fr-FR" dirty="0"/>
+          </a:p>
+          <a:p>
+            <a:r>
+              <a:rPr lang="fr-FR" dirty="0"/>
+              <a:t>Il y a 4 types principaux: </a:t>
+            </a:r>
+            <a:r>
+              <a:rPr lang="fr-FR" dirty="0" err="1"/>
+              <a:t>creation</a:t>
+            </a:r>
+            <a:r>
+              <a:rPr lang="fr-FR" dirty="0"/>
+              <a:t>, structurels, comportementaux, architectural</a:t>
+            </a:r>
+            <a:endParaRPr lang="en-US" dirty="0"/>
+          </a:p>
+        </p:txBody>
+      </p:sp>
+    </p:spTree>
+    <p:extLst>
+      <p:ext uri="{BB962C8B-B14F-4D97-AF65-F5344CB8AC3E}">
+        <p14:creationId xmlns:p14="http://schemas.microsoft.com/office/powerpoint/2010/main" val="2167477320"/>
+      </p:ext>
+    </p:extLst>
+  </p:cSld>
+  <p:clrMapOvr>
+    <a:masterClrMapping/>
+  </p:clrMapOvr>
+</p:sld>
+</file>
+
+<file path=ppt/slides/slide16.xml><?xml version="1.0" encoding="utf-8"?>
+<p:sld xmlns:a="http://schemas.openxmlformats.org/drawingml/2006/main" xmlns:r="http://schemas.openxmlformats.org/officeDocument/2006/relationships" xmlns:p="http://schemas.openxmlformats.org/presentationml/2006/main">
+  <p:cSld>
+    <p:spTree>
+      <p:nvGrpSpPr>
+        <p:cNvPr id="1" name=""/>
+        <p:cNvGrpSpPr/>
+        <p:nvPr/>
+      </p:nvGrpSpPr>
+      <p:grpSpPr>
+        <a:xfrm>
+          <a:off x="0" y="0"/>
+          <a:ext cx="0" cy="0"/>
+          <a:chOff x="0" y="0"/>
+          <a:chExt cx="0" cy="0"/>
+        </a:xfrm>
+      </p:grpSpPr>
+      <p:sp>
+        <p:nvSpPr>
+          <p:cNvPr id="2" name="Title 1">
+            <a:extLst>
+              <a:ext uri="{FF2B5EF4-FFF2-40B4-BE49-F238E27FC236}">
+                <a16:creationId xmlns:a16="http://schemas.microsoft.com/office/drawing/2014/main" id="{2C0DDD44-40B0-E9BF-0699-6BB016023237}"/>
+              </a:ext>
+            </a:extLst>
+          </p:cNvPr>
+          <p:cNvSpPr>
+            <a:spLocks noGrp="1"/>
+          </p:cNvSpPr>
+          <p:nvPr>
+            <p:ph type="title"/>
+          </p:nvPr>
+        </p:nvSpPr>
+        <p:spPr/>
+        <p:txBody>
+          <a:bodyPr/>
+          <a:lstStyle/>
+          <a:p>
+            <a:r>
+              <a:rPr lang="en-US" dirty="0">
+                <a:solidFill>
+                  <a:srgbClr val="2F5496"/>
+                </a:solidFill>
+                <a:latin typeface="Poppins SemiBold" panose="00000700000000000000" pitchFamily="2" charset="0"/>
+                <a:cs typeface="Poppins SemiBold" panose="00000700000000000000" pitchFamily="2" charset="0"/>
+              </a:rPr>
+              <a:t>PACKAGES RPM</a:t>
+            </a:r>
+            <a:endParaRPr lang="en-US" dirty="0"/>
+          </a:p>
+        </p:txBody>
+      </p:sp>
+      <p:sp>
+        <p:nvSpPr>
+          <p:cNvPr id="3" name="Content Placeholder 2">
+            <a:extLst>
+              <a:ext uri="{FF2B5EF4-FFF2-40B4-BE49-F238E27FC236}">
+                <a16:creationId xmlns:a16="http://schemas.microsoft.com/office/drawing/2014/main" id="{17977F0D-B782-6AEA-0D3C-8207E05FEE6F}"/>
+              </a:ext>
+            </a:extLst>
+          </p:cNvPr>
+          <p:cNvSpPr>
+            <a:spLocks noGrp="1"/>
+          </p:cNvSpPr>
+          <p:nvPr>
+            <p:ph idx="1"/>
+          </p:nvPr>
+        </p:nvSpPr>
+        <p:spPr/>
+        <p:txBody>
+          <a:bodyPr>
+            <a:normAutofit/>
+          </a:bodyPr>
+          <a:lstStyle/>
+          <a:p>
+            <a:r>
+              <a:rPr lang="en-US" dirty="0"/>
+              <a:t>Les packages RPM (RedHat Package Manager) </a:t>
+            </a:r>
+            <a:r>
+              <a:rPr lang="en-US" dirty="0" err="1"/>
+              <a:t>sont</a:t>
+            </a:r>
+            <a:r>
+              <a:rPr lang="en-US" dirty="0"/>
+              <a:t> utilizer pour </a:t>
+            </a:r>
+            <a:r>
+              <a:rPr lang="en-US" dirty="0" err="1"/>
+              <a:t>empaqueter</a:t>
+            </a:r>
+            <a:r>
+              <a:rPr lang="en-US" dirty="0"/>
+              <a:t> les </a:t>
+            </a:r>
+            <a:r>
+              <a:rPr lang="en-US" dirty="0" err="1"/>
+              <a:t>logiciels</a:t>
+            </a:r>
+            <a:r>
+              <a:rPr lang="en-US" dirty="0"/>
+              <a:t> sur les distributions Linux </a:t>
+            </a:r>
+            <a:r>
+              <a:rPr lang="en-US" dirty="0" err="1"/>
+              <a:t>basees</a:t>
+            </a:r>
+            <a:r>
+              <a:rPr lang="en-US" dirty="0"/>
+              <a:t> sur RPM.</a:t>
+            </a:r>
+          </a:p>
+          <a:p>
+            <a:endParaRPr lang="en-US" dirty="0"/>
+          </a:p>
+          <a:p>
+            <a:r>
+              <a:rPr lang="en-US" dirty="0"/>
+              <a:t>Le package RPM </a:t>
+            </a:r>
+            <a:r>
+              <a:rPr lang="en-US" dirty="0" err="1"/>
+              <a:t>contient</a:t>
+            </a:r>
+            <a:r>
+              <a:rPr lang="en-US" dirty="0"/>
+              <a:t> les sections </a:t>
+            </a:r>
+            <a:r>
+              <a:rPr lang="en-US" dirty="0" err="1"/>
+              <a:t>suivants</a:t>
+            </a:r>
+            <a:endParaRPr lang="en-US" dirty="0"/>
+          </a:p>
+          <a:p>
+            <a:pPr lvl="1"/>
+            <a:r>
+              <a:rPr lang="en-US" dirty="0"/>
+              <a:t>Section </a:t>
+            </a:r>
+            <a:r>
+              <a:rPr lang="en-US" dirty="0" err="1"/>
+              <a:t>metadonees</a:t>
+            </a:r>
+            <a:r>
+              <a:rPr lang="en-US" dirty="0"/>
+              <a:t>: nom du package, version, etc.</a:t>
+            </a:r>
+          </a:p>
+          <a:p>
+            <a:pPr lvl="1"/>
+            <a:r>
+              <a:rPr lang="en-US" dirty="0"/>
+              <a:t>Section </a:t>
+            </a:r>
+            <a:r>
+              <a:rPr lang="en-US" dirty="0" err="1"/>
+              <a:t>fichiers</a:t>
+            </a:r>
+            <a:r>
+              <a:rPr lang="en-US" dirty="0"/>
+              <a:t>: %files </a:t>
+            </a:r>
+            <a:r>
+              <a:rPr lang="en-US" dirty="0" err="1"/>
+              <a:t>liste</a:t>
+            </a:r>
+            <a:r>
+              <a:rPr lang="en-US" dirty="0"/>
+              <a:t> des </a:t>
+            </a:r>
+            <a:r>
+              <a:rPr lang="en-US" dirty="0" err="1"/>
+              <a:t>fichiers</a:t>
+            </a:r>
+            <a:r>
+              <a:rPr lang="en-US" dirty="0"/>
+              <a:t> </a:t>
+            </a:r>
+            <a:r>
+              <a:rPr lang="en-US" dirty="0" err="1"/>
+              <a:t>inclus</a:t>
+            </a:r>
+            <a:r>
+              <a:rPr lang="en-US" dirty="0"/>
+              <a:t> dans le package et </a:t>
+            </a:r>
+            <a:r>
+              <a:rPr lang="en-US" dirty="0" err="1"/>
+              <a:t>leurs</a:t>
+            </a:r>
+            <a:r>
+              <a:rPr lang="en-US" dirty="0"/>
+              <a:t> chemin de destination sur le </a:t>
+            </a:r>
+            <a:r>
+              <a:rPr lang="en-US" dirty="0" err="1"/>
+              <a:t>systeme</a:t>
+            </a:r>
+            <a:r>
+              <a:rPr lang="en-US" dirty="0"/>
+              <a:t>.</a:t>
+            </a:r>
+          </a:p>
+          <a:p>
+            <a:pPr lvl="1"/>
+            <a:r>
+              <a:rPr lang="en-US" dirty="0"/>
+              <a:t>Section dependances</a:t>
+            </a:r>
+          </a:p>
+          <a:p>
+            <a:pPr lvl="1"/>
+            <a:r>
+              <a:rPr lang="en-US" dirty="0"/>
+              <a:t>Section scripts: %pre, %post, %</a:t>
+            </a:r>
+            <a:r>
+              <a:rPr lang="en-US" dirty="0" err="1"/>
+              <a:t>postun</a:t>
+            </a:r>
+            <a:endParaRPr lang="en-US" dirty="0"/>
+          </a:p>
+        </p:txBody>
+      </p:sp>
+    </p:spTree>
+    <p:extLst>
+      <p:ext uri="{BB962C8B-B14F-4D97-AF65-F5344CB8AC3E}">
+        <p14:creationId xmlns:p14="http://schemas.microsoft.com/office/powerpoint/2010/main" val="2311025318"/>
+      </p:ext>
+    </p:extLst>
+  </p:cSld>
+  <p:clrMapOvr>
+    <a:masterClrMapping/>
+  </p:clrMapOvr>
+</p:sld>
+</file>
+
+<file path=ppt/slides/slide17.xml><?xml version="1.0" encoding="utf-8"?>
+<p:sld xmlns:a="http://schemas.openxmlformats.org/drawingml/2006/main" xmlns:r="http://schemas.openxmlformats.org/officeDocument/2006/relationships" xmlns:p="http://schemas.openxmlformats.org/presentationml/2006/main">
+  <p:cSld>
+    <p:spTree>
+      <p:nvGrpSpPr>
+        <p:cNvPr id="1" name=""/>
+        <p:cNvGrpSpPr/>
+        <p:nvPr/>
+      </p:nvGrpSpPr>
+      <p:grpSpPr>
+        <a:xfrm>
+          <a:off x="0" y="0"/>
+          <a:ext cx="0" cy="0"/>
+          <a:chOff x="0" y="0"/>
+          <a:chExt cx="0" cy="0"/>
+        </a:xfrm>
+      </p:grpSpPr>
+      <p:sp>
+        <p:nvSpPr>
+          <p:cNvPr id="2" name="Title 1">
+            <a:extLst>
+              <a:ext uri="{FF2B5EF4-FFF2-40B4-BE49-F238E27FC236}">
+                <a16:creationId xmlns:a16="http://schemas.microsoft.com/office/drawing/2014/main" id="{2C0DDD44-40B0-E9BF-0699-6BB016023237}"/>
+              </a:ext>
+            </a:extLst>
+          </p:cNvPr>
+          <p:cNvSpPr>
+            <a:spLocks noGrp="1"/>
+          </p:cNvSpPr>
+          <p:nvPr>
+            <p:ph type="title"/>
+          </p:nvPr>
+        </p:nvSpPr>
+        <p:spPr/>
+        <p:txBody>
+          <a:bodyPr/>
+          <a:lstStyle/>
+          <a:p>
+            <a:r>
+              <a:rPr lang="en-US" dirty="0">
+                <a:solidFill>
+                  <a:srgbClr val="2F5496"/>
+                </a:solidFill>
+                <a:latin typeface="Poppins SemiBold" panose="00000700000000000000" pitchFamily="2" charset="0"/>
+                <a:cs typeface="Poppins SemiBold" panose="00000700000000000000" pitchFamily="2" charset="0"/>
+              </a:rPr>
+              <a:t>PACKAGES RPM</a:t>
+            </a:r>
+            <a:endParaRPr lang="en-US" dirty="0"/>
+          </a:p>
+        </p:txBody>
+      </p:sp>
+      <p:sp>
+        <p:nvSpPr>
+          <p:cNvPr id="3" name="Content Placeholder 2">
+            <a:extLst>
+              <a:ext uri="{FF2B5EF4-FFF2-40B4-BE49-F238E27FC236}">
+                <a16:creationId xmlns:a16="http://schemas.microsoft.com/office/drawing/2014/main" id="{17977F0D-B782-6AEA-0D3C-8207E05FEE6F}"/>
+              </a:ext>
+            </a:extLst>
+          </p:cNvPr>
+          <p:cNvSpPr>
+            <a:spLocks noGrp="1"/>
+          </p:cNvSpPr>
+          <p:nvPr>
+            <p:ph idx="1"/>
+          </p:nvPr>
+        </p:nvSpPr>
+        <p:spPr/>
+        <p:txBody>
+          <a:bodyPr>
+            <a:normAutofit/>
+          </a:bodyPr>
+          <a:lstStyle/>
+          <a:p>
+            <a:r>
+              <a:rPr lang="en-US" dirty="0"/>
+              <a:t>Pour </a:t>
+            </a:r>
+            <a:r>
+              <a:rPr lang="en-US" dirty="0" err="1"/>
+              <a:t>creer</a:t>
+            </a:r>
+            <a:r>
+              <a:rPr lang="en-US" dirty="0"/>
+              <a:t> un package RPM, il faut:</a:t>
+            </a:r>
+          </a:p>
+          <a:p>
+            <a:endParaRPr lang="en-US" dirty="0"/>
+          </a:p>
+          <a:p>
+            <a:r>
+              <a:rPr lang="en-US" dirty="0" err="1"/>
+              <a:t>Creer</a:t>
+            </a:r>
+            <a:r>
+              <a:rPr lang="en-US" dirty="0"/>
+              <a:t> un dossier (~/</a:t>
+            </a:r>
+            <a:r>
+              <a:rPr lang="en-US" dirty="0" err="1"/>
+              <a:t>rpmbuild</a:t>
+            </a:r>
+            <a:r>
+              <a:rPr lang="en-US" dirty="0"/>
+              <a:t>/) avec les differents </a:t>
+            </a:r>
+            <a:r>
+              <a:rPr lang="en-US" dirty="0" err="1"/>
+              <a:t>fichiers</a:t>
+            </a:r>
+            <a:r>
+              <a:rPr lang="en-US" dirty="0"/>
+              <a:t>.</a:t>
+            </a:r>
+          </a:p>
+          <a:p>
+            <a:endParaRPr lang="en-US" dirty="0"/>
+          </a:p>
+          <a:p>
+            <a:r>
+              <a:rPr lang="en-US" dirty="0" err="1"/>
+              <a:t>Ecrire</a:t>
+            </a:r>
+            <a:r>
+              <a:rPr lang="en-US" dirty="0"/>
+              <a:t> un </a:t>
+            </a:r>
+            <a:r>
+              <a:rPr lang="en-US" dirty="0" err="1"/>
+              <a:t>fichier</a:t>
+            </a:r>
+            <a:r>
+              <a:rPr lang="en-US" dirty="0"/>
+              <a:t> .spec. Ce </a:t>
+            </a:r>
+            <a:r>
+              <a:rPr lang="en-US" dirty="0" err="1"/>
+              <a:t>fichier</a:t>
+            </a:r>
+            <a:r>
+              <a:rPr lang="en-US" dirty="0"/>
+              <a:t> </a:t>
+            </a:r>
+            <a:r>
+              <a:rPr lang="en-US" dirty="0" err="1"/>
+              <a:t>contient</a:t>
+            </a:r>
+            <a:r>
+              <a:rPr lang="en-US" dirty="0"/>
+              <a:t> les </a:t>
+            </a:r>
+            <a:r>
+              <a:rPr lang="en-US" dirty="0" err="1"/>
+              <a:t>metadonnees</a:t>
+            </a:r>
+            <a:r>
+              <a:rPr lang="en-US" dirty="0"/>
+              <a:t>, dependances, etc.</a:t>
+            </a:r>
+          </a:p>
+          <a:p>
+            <a:endParaRPr lang="en-US" dirty="0"/>
+          </a:p>
+          <a:p>
+            <a:r>
+              <a:rPr lang="en-US" dirty="0"/>
+              <a:t>Lancer la </a:t>
+            </a:r>
+            <a:r>
+              <a:rPr lang="en-US" dirty="0" err="1"/>
+              <a:t>commande</a:t>
+            </a:r>
+            <a:r>
+              <a:rPr lang="en-US" dirty="0"/>
+              <a:t> </a:t>
+            </a:r>
+            <a:r>
+              <a:rPr lang="en-US" dirty="0" err="1"/>
+              <a:t>rpmbuild</a:t>
+            </a:r>
+            <a:r>
+              <a:rPr lang="en-US" dirty="0"/>
+              <a:t>: </a:t>
+            </a:r>
+            <a:r>
+              <a:rPr lang="en-US" b="1" dirty="0" err="1"/>
+              <a:t>rpmbuild</a:t>
+            </a:r>
+            <a:r>
+              <a:rPr lang="en-US" b="1" dirty="0"/>
+              <a:t> –</a:t>
+            </a:r>
+            <a:r>
+              <a:rPr lang="en-US" b="1" dirty="0" err="1"/>
+              <a:t>ba</a:t>
+            </a:r>
+            <a:r>
+              <a:rPr lang="en-US" b="1" dirty="0"/>
+              <a:t> </a:t>
+            </a:r>
+            <a:r>
+              <a:rPr lang="en-US" b="1" dirty="0" err="1"/>
+              <a:t>app.spec</a:t>
+            </a:r>
+            <a:endParaRPr lang="en-US" b="1" dirty="0"/>
+          </a:p>
+        </p:txBody>
+      </p:sp>
+    </p:spTree>
+    <p:extLst>
+      <p:ext uri="{BB962C8B-B14F-4D97-AF65-F5344CB8AC3E}">
+        <p14:creationId xmlns:p14="http://schemas.microsoft.com/office/powerpoint/2010/main" val="177106023"/>
+      </p:ext>
+    </p:extLst>
+  </p:cSld>
+  <p:clrMapOvr>
+    <a:masterClrMapping/>
+  </p:clrMapOvr>
+</p:sld>
+</file>
+
+<file path=ppt/slides/slide18.xml><?xml version="1.0" encoding="utf-8"?>
+<p:sld xmlns:a="http://schemas.openxmlformats.org/drawingml/2006/main" xmlns:r="http://schemas.openxmlformats.org/officeDocument/2006/relationships" xmlns:p="http://schemas.openxmlformats.org/presentationml/2006/main">
+  <p:cSld>
+    <p:spTree>
+      <p:nvGrpSpPr>
+        <p:cNvPr id="1" name=""/>
+        <p:cNvGrpSpPr/>
+        <p:nvPr/>
+      </p:nvGrpSpPr>
+      <p:grpSpPr>
+        <a:xfrm>
+          <a:off x="0" y="0"/>
+          <a:ext cx="0" cy="0"/>
+          <a:chOff x="0" y="0"/>
+          <a:chExt cx="0" cy="0"/>
+        </a:xfrm>
+      </p:grpSpPr>
+      <p:sp>
+        <p:nvSpPr>
+          <p:cNvPr id="2" name="Title 1">
+            <a:extLst>
+              <a:ext uri="{FF2B5EF4-FFF2-40B4-BE49-F238E27FC236}">
+                <a16:creationId xmlns:a16="http://schemas.microsoft.com/office/drawing/2014/main" id="{2C0DDD44-40B0-E9BF-0699-6BB016023237}"/>
+              </a:ext>
+            </a:extLst>
+          </p:cNvPr>
+          <p:cNvSpPr>
+            <a:spLocks noGrp="1"/>
+          </p:cNvSpPr>
+          <p:nvPr>
+            <p:ph type="title"/>
+          </p:nvPr>
+        </p:nvSpPr>
         <p:spPr/>
         <p:txBody>
           <a:bodyPr/>
@@ -4719,7 +5487,7 @@
     </p:spTree>
     <p:extLst>
       <p:ext uri="{BB962C8B-B14F-4D97-AF65-F5344CB8AC3E}">
-        <p14:creationId xmlns:p14="http://schemas.microsoft.com/office/powerpoint/2010/main" val="2167477320"/>
+        <p14:creationId xmlns:p14="http://schemas.microsoft.com/office/powerpoint/2010/main" val="605998371"/>
       </p:ext>
     </p:extLst>
   </p:cSld>
@@ -5658,9 +6426,16 @@
             <p:ph type="title"/>
           </p:nvPr>
         </p:nvSpPr>
-        <p:spPr/>
-        <p:txBody>
-          <a:bodyPr/>
+        <p:spPr>
+          <a:xfrm>
+            <a:off x="838200" y="365126"/>
+            <a:ext cx="10515600" cy="679904"/>
+          </a:xfrm>
+        </p:spPr>
+        <p:txBody>
+          <a:bodyPr>
+            <a:normAutofit fontScale="90000"/>
+          </a:bodyPr>
           <a:lstStyle/>
           <a:p>
             <a:r>
@@ -5693,7 +6468,12 @@
             <p:ph idx="1"/>
           </p:nvPr>
         </p:nvSpPr>
-        <p:spPr/>
+        <p:spPr>
+          <a:xfrm>
+            <a:off x="838200" y="1045030"/>
+            <a:ext cx="10515600" cy="5131933"/>
+          </a:xfrm>
+        </p:spPr>
         <p:txBody>
           <a:bodyPr/>
           <a:lstStyle/>
@@ -5709,14 +6489,20 @@
             </a:pPr>
             <a:endParaRPr lang="en-US" dirty="0"/>
           </a:p>
+          <a:p>
+            <a:pPr marL="0" indent="0">
+              <a:buNone/>
+            </a:pPr>
+            <a:endParaRPr lang="en-US" dirty="0"/>
+          </a:p>
         </p:txBody>
       </p:sp>
       <p:pic>
         <p:nvPicPr>
-          <p:cNvPr id="5" name="Picture 4">
-            <a:extLst>
-              <a:ext uri="{FF2B5EF4-FFF2-40B4-BE49-F238E27FC236}">
-                <a16:creationId xmlns:a16="http://schemas.microsoft.com/office/drawing/2014/main" id="{FA03BF4F-338A-10C8-55C9-A200B1EF7552}"/>
+          <p:cNvPr id="8" name="Picture 7">
+            <a:extLst>
+              <a:ext uri="{FF2B5EF4-FFF2-40B4-BE49-F238E27FC236}">
+                <a16:creationId xmlns:a16="http://schemas.microsoft.com/office/drawing/2014/main" id="{F71FEDDD-AFD4-1563-37FA-E5451F3AA301}"/>
               </a:ext>
             </a:extLst>
           </p:cNvPr>
@@ -5726,21 +6512,15 @@
           <p:nvPr/>
         </p:nvPicPr>
         <p:blipFill>
-          <a:blip r:embed="rId2">
-            <a:extLst>
-              <a:ext uri="{28A0092B-C50C-407E-A947-70E740481C1C}">
-                <a14:useLocalDpi xmlns:a14="http://schemas.microsoft.com/office/drawing/2010/main" val="0"/>
-              </a:ext>
-            </a:extLst>
-          </a:blip>
+          <a:blip r:embed="rId2"/>
           <a:stretch>
             <a:fillRect/>
           </a:stretch>
         </p:blipFill>
         <p:spPr>
           <a:xfrm>
-            <a:off x="1436914" y="2579913"/>
-            <a:ext cx="9339943" cy="3912961"/>
+            <a:off x="838200" y="1450281"/>
+            <a:ext cx="10359149" cy="5131934"/>
           </a:xfrm>
           <a:prstGeom prst="rect">
             <a:avLst/>

</xml_diff>